<commit_message>
Save to PPT files
</commit_message>
<xml_diff>
--- a/resource/pptx-base.pptx
+++ b/resource/pptx-base.pptx
@@ -4,9 +4,6 @@
   <p:sldMasterIdLst>
     <p:sldMasterId id="2147483660" r:id="rId1"/>
   </p:sldMasterIdLst>
-  <p:sldIdLst>
-    <p:sldId id="256" r:id="rId2"/>
-  </p:sldIdLst>
   <p:sldSz cx="12192000" cy="6858000"/>
   <p:notesSz cx="6858000" cy="9144000"/>
   <p:defaultTextStyle>
@@ -278,7 +275,7 @@
           <a:p>
             <a:r>
               <a:rPr lang="ko-KR" altLang="en-US" dirty="0"/>
-              <a:t>마스터 제목 스타일 편집</a:t>
+              <a:t>제목</a:t>
             </a:r>
           </a:p>
         </p:txBody>
@@ -295,8 +292,8 @@
         </p:nvSpPr>
         <p:spPr>
           <a:xfrm>
-            <a:off x="336000" y="918000"/>
-            <a:ext cx="11520000" cy="5940000"/>
+            <a:off x="336000" y="1098000"/>
+            <a:ext cx="11520000" cy="5760000"/>
           </a:xfrm>
           <a:prstGeom prst="rect">
             <a:avLst/>
@@ -310,12 +307,84 @@
           <a:p>
             <a:pPr lvl="0"/>
             <a:r>
-              <a:rPr lang="ko-KR" altLang="en-US" dirty="0"/>
-              <a:t>마스터 텍스트 스타일을 편집합니다</a:t>
+              <a:rPr lang="en-US" altLang="ko-KR" dirty="0"/>
+              <a:t>1</a:t>
             </a:r>
+          </a:p>
+          <a:p>
+            <a:pPr lvl="0"/>
+            <a:r>
+              <a:rPr lang="en-US" altLang="ko-KR" dirty="0"/>
+              <a:t>2</a:t>
+            </a:r>
+          </a:p>
+          <a:p>
+            <a:pPr lvl="0"/>
+            <a:r>
+              <a:rPr lang="en-US" altLang="ko-KR" dirty="0"/>
+              <a:t>3</a:t>
+            </a:r>
+          </a:p>
+          <a:p>
+            <a:pPr lvl="0"/>
+            <a:r>
+              <a:rPr lang="en-US" altLang="ko-KR" dirty="0"/>
+              <a:t>4</a:t>
+            </a:r>
+          </a:p>
+          <a:p>
+            <a:pPr lvl="0"/>
+            <a:r>
+              <a:rPr lang="en-US" altLang="ko-KR" dirty="0"/>
+              <a:t>5</a:t>
+            </a:r>
+            <a:endParaRPr lang="ko-KR" altLang="en-US" dirty="0"/>
           </a:p>
         </p:txBody>
       </p:sp>
+      <p:cxnSp>
+        <p:nvCxnSpPr>
+          <p:cNvPr id="6" name="직선 연결선[R] 5">
+            <a:extLst>
+              <a:ext uri="{FF2B5EF4-FFF2-40B4-BE49-F238E27FC236}">
+                <a16:creationId xmlns:a16="http://schemas.microsoft.com/office/drawing/2014/main" id="{412AC23B-5310-0415-3F19-36736DDEE398}"/>
+              </a:ext>
+            </a:extLst>
+          </p:cNvPr>
+          <p:cNvCxnSpPr>
+            <a:cxnSpLocks/>
+          </p:cNvCxnSpPr>
+          <p:nvPr userDrawn="1"/>
+        </p:nvCxnSpPr>
+        <p:spPr>
+          <a:xfrm>
+            <a:off x="-25200" y="720000"/>
+            <a:ext cx="12240000" cy="0"/>
+          </a:xfrm>
+          <a:prstGeom prst="line">
+            <a:avLst/>
+          </a:prstGeom>
+          <a:ln>
+            <a:solidFill>
+              <a:schemeClr val="bg1"/>
+            </a:solidFill>
+          </a:ln>
+        </p:spPr>
+        <p:style>
+          <a:lnRef idx="1">
+            <a:schemeClr val="dk1"/>
+          </a:lnRef>
+          <a:fillRef idx="0">
+            <a:schemeClr val="dk1"/>
+          </a:fillRef>
+          <a:effectRef idx="0">
+            <a:schemeClr val="dk1"/>
+          </a:effectRef>
+          <a:fontRef idx="minor">
+            <a:schemeClr val="tx1"/>
+          </a:fontRef>
+        </p:style>
+      </p:cxnSp>
     </p:spTree>
     <p:extLst>
       <p:ext uri="{BB962C8B-B14F-4D97-AF65-F5344CB8AC3E}">
@@ -348,8 +417,8 @@
               </a:srgbClr>
             </a:outerShdw>
           </a:effectLst>
-          <a:latin typeface="나눔고딕 ExtraBold" panose="020D0904000000000000" pitchFamily="50" charset="-127"/>
-          <a:ea typeface="나눔고딕 ExtraBold" panose="020D0904000000000000" pitchFamily="50" charset="-127"/>
+          <a:latin typeface="NanumGothic" panose="020D0604000000000000" pitchFamily="34" charset="-127"/>
+          <a:ea typeface="NanumGothic" panose="020D0604000000000000" pitchFamily="34" charset="-127"/>
           <a:cs typeface="+mj-cs"/>
         </a:defRPr>
       </a:lvl1pPr>
@@ -360,7 +429,7 @@
           <a:spcPct val="150000"/>
         </a:lnSpc>
         <a:spcBef>
-          <a:spcPct val="20000"/>
+          <a:spcPts val="600"/>
         </a:spcBef>
         <a:buFontTx/>
         <a:buNone/>
@@ -638,120 +707,6 @@
     </p:otherStyle>
   </p:txStyles>
 </p:sldMaster>
-</file>
-
-<file path=ppt/slides/slide1.xml><?xml version="1.0" encoding="utf-8"?>
-<p:sld xmlns:a="http://schemas.openxmlformats.org/drawingml/2006/main" xmlns:r="http://schemas.openxmlformats.org/officeDocument/2006/relationships" xmlns:p="http://schemas.openxmlformats.org/presentationml/2006/main">
-  <p:cSld>
-    <p:spTree>
-      <p:nvGrpSpPr>
-        <p:cNvPr id="1" name=""/>
-        <p:cNvGrpSpPr/>
-        <p:nvPr/>
-      </p:nvGrpSpPr>
-      <p:grpSpPr>
-        <a:xfrm>
-          <a:off x="0" y="0"/>
-          <a:ext cx="0" cy="0"/>
-          <a:chOff x="0" y="0"/>
-          <a:chExt cx="0" cy="0"/>
-        </a:xfrm>
-      </p:grpSpPr>
-      <p:sp>
-        <p:nvSpPr>
-          <p:cNvPr id="2" name="제목 1">
-            <a:extLst>
-              <a:ext uri="{FF2B5EF4-FFF2-40B4-BE49-F238E27FC236}">
-                <a16:creationId xmlns:a16="http://schemas.microsoft.com/office/drawing/2014/main" id="{1B39106E-8DF5-85FF-6DA2-85138A8CEE08}"/>
-              </a:ext>
-            </a:extLst>
-          </p:cNvPr>
-          <p:cNvSpPr>
-            <a:spLocks noGrp="1"/>
-          </p:cNvSpPr>
-          <p:nvPr>
-            <p:ph type="title"/>
-          </p:nvPr>
-        </p:nvSpPr>
-        <p:spPr/>
-        <p:txBody>
-          <a:bodyPr/>
-          <a:lstStyle/>
-          <a:p>
-            <a:r>
-              <a:rPr lang="en-US" altLang="ko-KR" dirty="0"/>
-              <a:t>0</a:t>
-            </a:r>
-            <a:endParaRPr lang="ko-KR" altLang="en-US" dirty="0"/>
-          </a:p>
-        </p:txBody>
-      </p:sp>
-      <p:sp>
-        <p:nvSpPr>
-          <p:cNvPr id="3" name="내용 개체 틀 2">
-            <a:extLst>
-              <a:ext uri="{FF2B5EF4-FFF2-40B4-BE49-F238E27FC236}">
-                <a16:creationId xmlns:a16="http://schemas.microsoft.com/office/drawing/2014/main" id="{2C49C35D-5A17-AECD-0616-60D6382AF77B}"/>
-              </a:ext>
-            </a:extLst>
-          </p:cNvPr>
-          <p:cNvSpPr>
-            <a:spLocks noGrp="1"/>
-          </p:cNvSpPr>
-          <p:nvPr>
-            <p:ph idx="1"/>
-          </p:nvPr>
-        </p:nvSpPr>
-        <p:spPr/>
-        <p:txBody>
-          <a:bodyPr/>
-          <a:lstStyle/>
-          <a:p>
-            <a:r>
-              <a:rPr lang="en-US" altLang="ko-KR" dirty="0"/>
-              <a:t>1</a:t>
-            </a:r>
-          </a:p>
-          <a:p>
-            <a:r>
-              <a:rPr lang="en-US" altLang="ko-KR" dirty="0"/>
-              <a:t>2</a:t>
-            </a:r>
-          </a:p>
-          <a:p>
-            <a:r>
-              <a:rPr lang="en-US" altLang="ko-KR" dirty="0"/>
-              <a:t>3</a:t>
-            </a:r>
-          </a:p>
-          <a:p>
-            <a:r>
-              <a:rPr lang="en-US" altLang="ko-KR" dirty="0"/>
-              <a:t>4</a:t>
-            </a:r>
-          </a:p>
-          <a:p>
-            <a:r>
-              <a:rPr lang="en-US" altLang="ko-KR" dirty="0"/>
-              <a:t>5</a:t>
-            </a:r>
-          </a:p>
-        </p:txBody>
-      </p:sp>
-    </p:spTree>
-    <p:extLst>
-      <p:ext uri="{BB962C8B-B14F-4D97-AF65-F5344CB8AC3E}">
-        <p14:creationId xmlns:p14="http://schemas.microsoft.com/office/powerpoint/2010/main" val="1565843295"/>
-      </p:ext>
-    </p:extLst>
-  </p:cSld>
-  <p:clrMapOvr>
-    <a:masterClrMapping/>
-  </p:clrMapOvr>
-  <p:transition>
-    <p:strips dir="rd"/>
-  </p:transition>
-</p:sld>
 </file>
 
 <file path=ppt/theme/theme1.xml><?xml version="1.0" encoding="utf-8"?>

</xml_diff>